<commit_message>
Add compiling programm crc16_usb.vhd and modified docs
</commit_message>
<xml_diff>
--- a/task1/docs/Презентация схемотехника.pptx
+++ b/task1/docs/Презентация схемотехника.pptx
@@ -261,7 +261,7 @@
           <a:p>
             <a:fld id="{E0718804-DD06-4CCD-8676-18E9510E23D9}" type="datetimeFigureOut">
               <a:rPr lang="ru-RU" smtClean="0"/>
-              <a:t>07.09.2025</a:t>
+              <a:t>15.09.2025</a:t>
             </a:fld>
             <a:endParaRPr lang="ru-RU"/>
           </a:p>
@@ -459,7 +459,7 @@
           <a:p>
             <a:fld id="{E0718804-DD06-4CCD-8676-18E9510E23D9}" type="datetimeFigureOut">
               <a:rPr lang="ru-RU" smtClean="0"/>
-              <a:t>07.09.2025</a:t>
+              <a:t>15.09.2025</a:t>
             </a:fld>
             <a:endParaRPr lang="ru-RU"/>
           </a:p>
@@ -667,7 +667,7 @@
           <a:p>
             <a:fld id="{E0718804-DD06-4CCD-8676-18E9510E23D9}" type="datetimeFigureOut">
               <a:rPr lang="ru-RU" smtClean="0"/>
-              <a:t>07.09.2025</a:t>
+              <a:t>15.09.2025</a:t>
             </a:fld>
             <a:endParaRPr lang="ru-RU"/>
           </a:p>
@@ -865,7 +865,7 @@
           <a:p>
             <a:fld id="{E0718804-DD06-4CCD-8676-18E9510E23D9}" type="datetimeFigureOut">
               <a:rPr lang="ru-RU" smtClean="0"/>
-              <a:t>07.09.2025</a:t>
+              <a:t>15.09.2025</a:t>
             </a:fld>
             <a:endParaRPr lang="ru-RU"/>
           </a:p>
@@ -1140,7 +1140,7 @@
           <a:p>
             <a:fld id="{E0718804-DD06-4CCD-8676-18E9510E23D9}" type="datetimeFigureOut">
               <a:rPr lang="ru-RU" smtClean="0"/>
-              <a:t>07.09.2025</a:t>
+              <a:t>15.09.2025</a:t>
             </a:fld>
             <a:endParaRPr lang="ru-RU"/>
           </a:p>
@@ -1405,7 +1405,7 @@
           <a:p>
             <a:fld id="{E0718804-DD06-4CCD-8676-18E9510E23D9}" type="datetimeFigureOut">
               <a:rPr lang="ru-RU" smtClean="0"/>
-              <a:t>07.09.2025</a:t>
+              <a:t>15.09.2025</a:t>
             </a:fld>
             <a:endParaRPr lang="ru-RU"/>
           </a:p>
@@ -1817,7 +1817,7 @@
           <a:p>
             <a:fld id="{E0718804-DD06-4CCD-8676-18E9510E23D9}" type="datetimeFigureOut">
               <a:rPr lang="ru-RU" smtClean="0"/>
-              <a:t>07.09.2025</a:t>
+              <a:t>15.09.2025</a:t>
             </a:fld>
             <a:endParaRPr lang="ru-RU"/>
           </a:p>
@@ -1958,7 +1958,7 @@
           <a:p>
             <a:fld id="{E0718804-DD06-4CCD-8676-18E9510E23D9}" type="datetimeFigureOut">
               <a:rPr lang="ru-RU" smtClean="0"/>
-              <a:t>07.09.2025</a:t>
+              <a:t>15.09.2025</a:t>
             </a:fld>
             <a:endParaRPr lang="ru-RU"/>
           </a:p>
@@ -2071,7 +2071,7 @@
           <a:p>
             <a:fld id="{E0718804-DD06-4CCD-8676-18E9510E23D9}" type="datetimeFigureOut">
               <a:rPr lang="ru-RU" smtClean="0"/>
-              <a:t>07.09.2025</a:t>
+              <a:t>15.09.2025</a:t>
             </a:fld>
             <a:endParaRPr lang="ru-RU"/>
           </a:p>
@@ -2382,7 +2382,7 @@
           <a:p>
             <a:fld id="{E0718804-DD06-4CCD-8676-18E9510E23D9}" type="datetimeFigureOut">
               <a:rPr lang="ru-RU" smtClean="0"/>
-              <a:t>07.09.2025</a:t>
+              <a:t>15.09.2025</a:t>
             </a:fld>
             <a:endParaRPr lang="ru-RU"/>
           </a:p>
@@ -2670,7 +2670,7 @@
           <a:p>
             <a:fld id="{E0718804-DD06-4CCD-8676-18E9510E23D9}" type="datetimeFigureOut">
               <a:rPr lang="ru-RU" smtClean="0"/>
-              <a:t>07.09.2025</a:t>
+              <a:t>15.09.2025</a:t>
             </a:fld>
             <a:endParaRPr lang="ru-RU"/>
           </a:p>
@@ -2911,7 +2911,7 @@
           <a:p>
             <a:fld id="{E0718804-DD06-4CCD-8676-18E9510E23D9}" type="datetimeFigureOut">
               <a:rPr lang="ru-RU" smtClean="0"/>
-              <a:t>07.09.2025</a:t>
+              <a:t>15.09.2025</a:t>
             </a:fld>
             <a:endParaRPr lang="ru-RU"/>
           </a:p>
@@ -3532,7 +3532,6 @@
               <a:rPr lang="ru-RU" dirty="0"/>
               <a:t>) по входному потоку бит</a:t>
             </a:r>
-            <a:endParaRPr lang="ru-RU" dirty="0"/>
           </a:p>
         </p:txBody>
       </p:sp>
@@ -4625,24 +4624,110 @@
       </p:sp>
       <p:pic>
         <p:nvPicPr>
-          <p:cNvPr id="7" name="Рисунок 6"/>
-          <p:cNvPicPr/>
+          <p:cNvPr id="1026" name="Picture 2"/>
+          <p:cNvPicPr>
+            <a:picLocks noChangeAspect="1" noChangeArrowheads="1"/>
+          </p:cNvPicPr>
           <p:nvPr/>
         </p:nvPicPr>
         <p:blipFill>
-          <a:blip r:embed="rId2"/>
+          <a:blip r:embed="rId2">
+            <a:extLst>
+              <a:ext uri="{28A0092B-C50C-407E-A947-70E740481C1C}">
+                <a14:useLocalDpi xmlns:a14="http://schemas.microsoft.com/office/drawing/2010/main" val="0"/>
+              </a:ext>
+            </a:extLst>
+          </a:blip>
+          <a:srcRect/>
           <a:stretch>
             <a:fillRect/>
           </a:stretch>
         </p:blipFill>
-        <p:spPr>
+        <p:spPr bwMode="auto">
           <a:xfrm>
-            <a:off x="1250679" y="2698570"/>
-            <a:ext cx="3633470" cy="3033395"/>
+            <a:off x="430993" y="3363366"/>
+            <a:ext cx="11432912" cy="2483409"/>
           </a:xfrm>
           <a:prstGeom prst="rect">
             <a:avLst/>
           </a:prstGeom>
+          <a:noFill/>
+          <a:ln>
+            <a:noFill/>
+          </a:ln>
+          <a:extLst>
+            <a:ext uri="{909E8E84-426E-40DD-AFC4-6F175D3DCCD1}">
+              <a14:hiddenFill xmlns:a14="http://schemas.microsoft.com/office/drawing/2010/main">
+                <a:solidFill>
+                  <a:schemeClr val="accent1"/>
+                </a:solidFill>
+              </a14:hiddenFill>
+            </a:ext>
+            <a:ext uri="{91240B29-F687-4F45-9708-019B960494DF}">
+              <a14:hiddenLine xmlns:a14="http://schemas.microsoft.com/office/drawing/2010/main" w="9525">
+                <a:solidFill>
+                  <a:schemeClr val="tx1"/>
+                </a:solidFill>
+                <a:miter lim="800000"/>
+                <a:headEnd/>
+                <a:tailEnd/>
+              </a14:hiddenLine>
+            </a:ext>
+          </a:extLst>
+        </p:spPr>
+      </p:pic>
+      <p:pic>
+        <p:nvPicPr>
+          <p:cNvPr id="1028" name="Picture 4"/>
+          <p:cNvPicPr>
+            <a:picLocks noChangeAspect="1" noChangeArrowheads="1"/>
+          </p:cNvPicPr>
+          <p:nvPr/>
+        </p:nvPicPr>
+        <p:blipFill>
+          <a:blip r:embed="rId3">
+            <a:extLst>
+              <a:ext uri="{28A0092B-C50C-407E-A947-70E740481C1C}">
+                <a14:useLocalDpi xmlns:a14="http://schemas.microsoft.com/office/drawing/2010/main" val="0"/>
+              </a:ext>
+            </a:extLst>
+          </a:blip>
+          <a:srcRect/>
+          <a:stretch>
+            <a:fillRect/>
+          </a:stretch>
+        </p:blipFill>
+        <p:spPr bwMode="auto">
+          <a:xfrm>
+            <a:off x="7877328" y="297034"/>
+            <a:ext cx="4051435" cy="3302506"/>
+          </a:xfrm>
+          <a:prstGeom prst="rect">
+            <a:avLst/>
+          </a:prstGeom>
+          <a:noFill/>
+          <a:ln>
+            <a:noFill/>
+          </a:ln>
+          <a:extLst>
+            <a:ext uri="{909E8E84-426E-40DD-AFC4-6F175D3DCCD1}">
+              <a14:hiddenFill xmlns:a14="http://schemas.microsoft.com/office/drawing/2010/main">
+                <a:solidFill>
+                  <a:schemeClr val="accent1"/>
+                </a:solidFill>
+              </a14:hiddenFill>
+            </a:ext>
+            <a:ext uri="{91240B29-F687-4F45-9708-019B960494DF}">
+              <a14:hiddenLine xmlns:a14="http://schemas.microsoft.com/office/drawing/2010/main" w="9525">
+                <a:solidFill>
+                  <a:schemeClr val="tx1"/>
+                </a:solidFill>
+                <a:miter lim="800000"/>
+                <a:headEnd/>
+                <a:tailEnd/>
+              </a14:hiddenLine>
+            </a:ext>
+          </a:extLst>
         </p:spPr>
       </p:pic>
     </p:spTree>
@@ -4710,7 +4795,7 @@
       </p:sp>
       <p:pic>
         <p:nvPicPr>
-          <p:cNvPr id="2051" name="Picture 3"/>
+          <p:cNvPr id="1026" name="Picture 2"/>
           <p:cNvPicPr>
             <a:picLocks noChangeAspect="1" noChangeArrowheads="1"/>
           </p:cNvPicPr>
@@ -4731,8 +4816,8 @@
         </p:blipFill>
         <p:spPr bwMode="auto">
           <a:xfrm>
-            <a:off x="3204319" y="1333742"/>
-            <a:ext cx="5337115" cy="5433981"/>
+            <a:off x="2164466" y="1296365"/>
+            <a:ext cx="7954202" cy="5472394"/>
           </a:xfrm>
           <a:prstGeom prst="rect">
             <a:avLst/>
@@ -4884,7 +4969,6 @@
               <a:rPr lang="ru-RU" dirty="0"/>
               <a:t>)</a:t>
             </a:r>
-            <a:endParaRPr lang="ru-RU" dirty="0"/>
           </a:p>
         </p:txBody>
       </p:sp>

</xml_diff>